<commit_message>
finish tech paper, research paper notes, exam 2 ppt
</commit_message>
<xml_diff>
--- a/SI/Exam 2 Review Session.pptx
+++ b/SI/Exam 2 Review Session.pptx
@@ -107,7 +107,16 @@
       </a:defRPr>
     </a:lvl9pPr>
   </p:defaultTextStyle>
+  <p:extLst>
+    <p:ext uri="{EFAFB233-063F-42B5-8137-9DF3F51BA10A}">
+      <p15:sldGuideLst xmlns:p15="http://schemas.microsoft.com/office/powerpoint/2012/main"/>
+    </p:ext>
+  </p:extLst>
 </p:presentation>
+</file>
+
+<file path=ppt/revisionInfo.xml><?xml version="1.0" encoding="utf-8"?>
+<p1510:revInfo xmlns:a="http://schemas.openxmlformats.org/drawingml/2006/main" xmlns:r="http://schemas.openxmlformats.org/officeDocument/2006/relationships" xmlns:p1510="http://schemas.microsoft.com/office/powerpoint/2015/10/main"/>
 </file>
 
 <file path=ppt/slideLayouts/slideLayout1.xml><?xml version="1.0" encoding="utf-8"?>
@@ -257,7 +266,7 @@
           <a:p>
             <a:fld id="{4895BF43-F6AB-4177-9675-B7503086D0D4}" type="datetimeFigureOut">
               <a:rPr lang="en-US" smtClean="0"/>
-              <a:t>9/28/2017</a:t>
+              <a:t>10/3/2017</a:t>
             </a:fld>
             <a:endParaRPr lang="en-US"/>
           </a:p>
@@ -455,7 +464,7 @@
           <a:p>
             <a:fld id="{4895BF43-F6AB-4177-9675-B7503086D0D4}" type="datetimeFigureOut">
               <a:rPr lang="en-US" smtClean="0"/>
-              <a:t>9/28/2017</a:t>
+              <a:t>10/3/2017</a:t>
             </a:fld>
             <a:endParaRPr lang="en-US"/>
           </a:p>
@@ -663,7 +672,7 @@
           <a:p>
             <a:fld id="{4895BF43-F6AB-4177-9675-B7503086D0D4}" type="datetimeFigureOut">
               <a:rPr lang="en-US" smtClean="0"/>
-              <a:t>9/28/2017</a:t>
+              <a:t>10/3/2017</a:t>
             </a:fld>
             <a:endParaRPr lang="en-US"/>
           </a:p>
@@ -861,7 +870,7 @@
           <a:p>
             <a:fld id="{4895BF43-F6AB-4177-9675-B7503086D0D4}" type="datetimeFigureOut">
               <a:rPr lang="en-US" smtClean="0"/>
-              <a:t>9/28/2017</a:t>
+              <a:t>10/3/2017</a:t>
             </a:fld>
             <a:endParaRPr lang="en-US"/>
           </a:p>
@@ -1136,7 +1145,7 @@
           <a:p>
             <a:fld id="{4895BF43-F6AB-4177-9675-B7503086D0D4}" type="datetimeFigureOut">
               <a:rPr lang="en-US" smtClean="0"/>
-              <a:t>9/28/2017</a:t>
+              <a:t>10/3/2017</a:t>
             </a:fld>
             <a:endParaRPr lang="en-US"/>
           </a:p>
@@ -1401,7 +1410,7 @@
           <a:p>
             <a:fld id="{4895BF43-F6AB-4177-9675-B7503086D0D4}" type="datetimeFigureOut">
               <a:rPr lang="en-US" smtClean="0"/>
-              <a:t>9/28/2017</a:t>
+              <a:t>10/3/2017</a:t>
             </a:fld>
             <a:endParaRPr lang="en-US"/>
           </a:p>
@@ -1813,7 +1822,7 @@
           <a:p>
             <a:fld id="{4895BF43-F6AB-4177-9675-B7503086D0D4}" type="datetimeFigureOut">
               <a:rPr lang="en-US" smtClean="0"/>
-              <a:t>9/28/2017</a:t>
+              <a:t>10/3/2017</a:t>
             </a:fld>
             <a:endParaRPr lang="en-US"/>
           </a:p>
@@ -1954,7 +1963,7 @@
           <a:p>
             <a:fld id="{4895BF43-F6AB-4177-9675-B7503086D0D4}" type="datetimeFigureOut">
               <a:rPr lang="en-US" smtClean="0"/>
-              <a:t>9/28/2017</a:t>
+              <a:t>10/3/2017</a:t>
             </a:fld>
             <a:endParaRPr lang="en-US"/>
           </a:p>
@@ -2067,7 +2076,7 @@
           <a:p>
             <a:fld id="{4895BF43-F6AB-4177-9675-B7503086D0D4}" type="datetimeFigureOut">
               <a:rPr lang="en-US" smtClean="0"/>
-              <a:t>9/28/2017</a:t>
+              <a:t>10/3/2017</a:t>
             </a:fld>
             <a:endParaRPr lang="en-US"/>
           </a:p>
@@ -2378,7 +2387,7 @@
           <a:p>
             <a:fld id="{4895BF43-F6AB-4177-9675-B7503086D0D4}" type="datetimeFigureOut">
               <a:rPr lang="en-US" smtClean="0"/>
-              <a:t>9/28/2017</a:t>
+              <a:t>10/3/2017</a:t>
             </a:fld>
             <a:endParaRPr lang="en-US"/>
           </a:p>
@@ -2666,7 +2675,7 @@
           <a:p>
             <a:fld id="{4895BF43-F6AB-4177-9675-B7503086D0D4}" type="datetimeFigureOut">
               <a:rPr lang="en-US" smtClean="0"/>
-              <a:t>9/28/2017</a:t>
+              <a:t>10/3/2017</a:t>
             </a:fld>
             <a:endParaRPr lang="en-US"/>
           </a:p>
@@ -2907,7 +2916,7 @@
           <a:p>
             <a:fld id="{4895BF43-F6AB-4177-9675-B7503086D0D4}" type="datetimeFigureOut">
               <a:rPr lang="en-US" smtClean="0"/>
-              <a:t>9/28/2017</a:t>
+              <a:t>10/3/2017</a:t>
             </a:fld>
             <a:endParaRPr lang="en-US"/>
           </a:p>
@@ -3438,8 +3447,8 @@
           </a:p>
         </p:txBody>
       </p:sp>
-      <mc:AlternateContent xmlns:mc="http://schemas.openxmlformats.org/markup-compatibility/2006">
-        <mc:Choice xmlns:a14="http://schemas.microsoft.com/office/drawing/2010/main" Requires="a14">
+      <mc:AlternateContent xmlns:mc="http://schemas.openxmlformats.org/markup-compatibility/2006" xmlns:a14="http://schemas.microsoft.com/office/drawing/2010/main">
+        <mc:Choice Requires="a14">
           <p:sp>
             <p:nvSpPr>
               <p:cNvPr id="3" name="Content Placeholder 2">
@@ -4078,7 +4087,7 @@
             </p:txBody>
           </p:sp>
         </mc:Choice>
-        <mc:Fallback>
+        <mc:Fallback xmlns="">
           <p:sp>
             <p:nvSpPr>
               <p:cNvPr id="3" name="Content Placeholder 2">
@@ -4128,6 +4137,408 @@
   <p:clrMapOvr>
     <a:masterClrMapping/>
   </p:clrMapOvr>
+  <p:timing>
+    <p:tnLst>
+      <p:par>
+        <p:cTn id="1" dur="indefinite" restart="never" nodeType="tmRoot">
+          <p:childTnLst>
+            <p:seq concurrent="1" nextAc="seek">
+              <p:cTn id="2" dur="indefinite" nodeType="mainSeq">
+                <p:childTnLst>
+                  <p:par>
+                    <p:cTn id="3" fill="hold">
+                      <p:stCondLst>
+                        <p:cond delay="indefinite"/>
+                      </p:stCondLst>
+                      <p:childTnLst>
+                        <p:par>
+                          <p:cTn id="4" fill="hold">
+                            <p:stCondLst>
+                              <p:cond delay="0"/>
+                            </p:stCondLst>
+                            <p:childTnLst>
+                              <p:par>
+                                <p:cTn id="5" presetID="1" presetClass="entr" presetSubtype="0" fill="hold" grpId="0" nodeType="clickEffect">
+                                  <p:stCondLst>
+                                    <p:cond delay="0"/>
+                                  </p:stCondLst>
+                                  <p:childTnLst>
+                                    <p:set>
+                                      <p:cBhvr>
+                                        <p:cTn id="6" dur="1" fill="hold">
+                                          <p:stCondLst>
+                                            <p:cond delay="0"/>
+                                          </p:stCondLst>
+                                        </p:cTn>
+                                        <p:tgtEl>
+                                          <p:spTgt spid="3">
+                                            <p:txEl>
+                                              <p:pRg st="0" end="0"/>
+                                            </p:txEl>
+                                          </p:spTgt>
+                                        </p:tgtEl>
+                                        <p:attrNameLst>
+                                          <p:attrName>style.visibility</p:attrName>
+                                        </p:attrNameLst>
+                                      </p:cBhvr>
+                                      <p:to>
+                                        <p:strVal val="visible"/>
+                                      </p:to>
+                                    </p:set>
+                                  </p:childTnLst>
+                                </p:cTn>
+                              </p:par>
+                            </p:childTnLst>
+                          </p:cTn>
+                        </p:par>
+                      </p:childTnLst>
+                    </p:cTn>
+                  </p:par>
+                  <p:par>
+                    <p:cTn id="7" fill="hold">
+                      <p:stCondLst>
+                        <p:cond delay="indefinite"/>
+                      </p:stCondLst>
+                      <p:childTnLst>
+                        <p:par>
+                          <p:cTn id="8" fill="hold">
+                            <p:stCondLst>
+                              <p:cond delay="0"/>
+                            </p:stCondLst>
+                            <p:childTnLst>
+                              <p:par>
+                                <p:cTn id="9" presetID="1" presetClass="entr" presetSubtype="0" fill="hold" grpId="0" nodeType="clickEffect">
+                                  <p:stCondLst>
+                                    <p:cond delay="0"/>
+                                  </p:stCondLst>
+                                  <p:childTnLst>
+                                    <p:set>
+                                      <p:cBhvr>
+                                        <p:cTn id="10" dur="1" fill="hold">
+                                          <p:stCondLst>
+                                            <p:cond delay="0"/>
+                                          </p:stCondLst>
+                                        </p:cTn>
+                                        <p:tgtEl>
+                                          <p:spTgt spid="3">
+                                            <p:txEl>
+                                              <p:pRg st="1" end="1"/>
+                                            </p:txEl>
+                                          </p:spTgt>
+                                        </p:tgtEl>
+                                        <p:attrNameLst>
+                                          <p:attrName>style.visibility</p:attrName>
+                                        </p:attrNameLst>
+                                      </p:cBhvr>
+                                      <p:to>
+                                        <p:strVal val="visible"/>
+                                      </p:to>
+                                    </p:set>
+                                  </p:childTnLst>
+                                </p:cTn>
+                              </p:par>
+                              <p:par>
+                                <p:cTn id="11" presetID="1" presetClass="entr" presetSubtype="0" fill="hold" grpId="0" nodeType="withEffect">
+                                  <p:stCondLst>
+                                    <p:cond delay="0"/>
+                                  </p:stCondLst>
+                                  <p:childTnLst>
+                                    <p:set>
+                                      <p:cBhvr>
+                                        <p:cTn id="12" dur="1" fill="hold">
+                                          <p:stCondLst>
+                                            <p:cond delay="0"/>
+                                          </p:stCondLst>
+                                        </p:cTn>
+                                        <p:tgtEl>
+                                          <p:spTgt spid="3">
+                                            <p:txEl>
+                                              <p:pRg st="2" end="2"/>
+                                            </p:txEl>
+                                          </p:spTgt>
+                                        </p:tgtEl>
+                                        <p:attrNameLst>
+                                          <p:attrName>style.visibility</p:attrName>
+                                        </p:attrNameLst>
+                                      </p:cBhvr>
+                                      <p:to>
+                                        <p:strVal val="visible"/>
+                                      </p:to>
+                                    </p:set>
+                                  </p:childTnLst>
+                                </p:cTn>
+                              </p:par>
+                              <p:par>
+                                <p:cTn id="13" presetID="1" presetClass="entr" presetSubtype="0" fill="hold" grpId="0" nodeType="withEffect">
+                                  <p:stCondLst>
+                                    <p:cond delay="0"/>
+                                  </p:stCondLst>
+                                  <p:childTnLst>
+                                    <p:set>
+                                      <p:cBhvr>
+                                        <p:cTn id="14" dur="1" fill="hold">
+                                          <p:stCondLst>
+                                            <p:cond delay="0"/>
+                                          </p:stCondLst>
+                                        </p:cTn>
+                                        <p:tgtEl>
+                                          <p:spTgt spid="3">
+                                            <p:txEl>
+                                              <p:pRg st="3" end="3"/>
+                                            </p:txEl>
+                                          </p:spTgt>
+                                        </p:tgtEl>
+                                        <p:attrNameLst>
+                                          <p:attrName>style.visibility</p:attrName>
+                                        </p:attrNameLst>
+                                      </p:cBhvr>
+                                      <p:to>
+                                        <p:strVal val="visible"/>
+                                      </p:to>
+                                    </p:set>
+                                  </p:childTnLst>
+                                </p:cTn>
+                              </p:par>
+                            </p:childTnLst>
+                          </p:cTn>
+                        </p:par>
+                      </p:childTnLst>
+                    </p:cTn>
+                  </p:par>
+                  <p:par>
+                    <p:cTn id="15" fill="hold">
+                      <p:stCondLst>
+                        <p:cond delay="indefinite"/>
+                      </p:stCondLst>
+                      <p:childTnLst>
+                        <p:par>
+                          <p:cTn id="16" fill="hold">
+                            <p:stCondLst>
+                              <p:cond delay="0"/>
+                            </p:stCondLst>
+                            <p:childTnLst>
+                              <p:par>
+                                <p:cTn id="17" presetID="1" presetClass="entr" presetSubtype="0" fill="hold" grpId="0" nodeType="clickEffect">
+                                  <p:stCondLst>
+                                    <p:cond delay="0"/>
+                                  </p:stCondLst>
+                                  <p:childTnLst>
+                                    <p:set>
+                                      <p:cBhvr>
+                                        <p:cTn id="18" dur="1" fill="hold">
+                                          <p:stCondLst>
+                                            <p:cond delay="0"/>
+                                          </p:stCondLst>
+                                        </p:cTn>
+                                        <p:tgtEl>
+                                          <p:spTgt spid="3">
+                                            <p:txEl>
+                                              <p:pRg st="4" end="4"/>
+                                            </p:txEl>
+                                          </p:spTgt>
+                                        </p:tgtEl>
+                                        <p:attrNameLst>
+                                          <p:attrName>style.visibility</p:attrName>
+                                        </p:attrNameLst>
+                                      </p:cBhvr>
+                                      <p:to>
+                                        <p:strVal val="visible"/>
+                                      </p:to>
+                                    </p:set>
+                                  </p:childTnLst>
+                                </p:cTn>
+                              </p:par>
+                              <p:par>
+                                <p:cTn id="19" presetID="1" presetClass="entr" presetSubtype="0" fill="hold" grpId="0" nodeType="withEffect">
+                                  <p:stCondLst>
+                                    <p:cond delay="0"/>
+                                  </p:stCondLst>
+                                  <p:childTnLst>
+                                    <p:set>
+                                      <p:cBhvr>
+                                        <p:cTn id="20" dur="1" fill="hold">
+                                          <p:stCondLst>
+                                            <p:cond delay="0"/>
+                                          </p:stCondLst>
+                                        </p:cTn>
+                                        <p:tgtEl>
+                                          <p:spTgt spid="3">
+                                            <p:txEl>
+                                              <p:pRg st="5" end="5"/>
+                                            </p:txEl>
+                                          </p:spTgt>
+                                        </p:tgtEl>
+                                        <p:attrNameLst>
+                                          <p:attrName>style.visibility</p:attrName>
+                                        </p:attrNameLst>
+                                      </p:cBhvr>
+                                      <p:to>
+                                        <p:strVal val="visible"/>
+                                      </p:to>
+                                    </p:set>
+                                  </p:childTnLst>
+                                </p:cTn>
+                              </p:par>
+                              <p:par>
+                                <p:cTn id="21" presetID="1" presetClass="entr" presetSubtype="0" fill="hold" grpId="0" nodeType="withEffect">
+                                  <p:stCondLst>
+                                    <p:cond delay="0"/>
+                                  </p:stCondLst>
+                                  <p:childTnLst>
+                                    <p:set>
+                                      <p:cBhvr>
+                                        <p:cTn id="22" dur="1" fill="hold">
+                                          <p:stCondLst>
+                                            <p:cond delay="0"/>
+                                          </p:stCondLst>
+                                        </p:cTn>
+                                        <p:tgtEl>
+                                          <p:spTgt spid="3">
+                                            <p:txEl>
+                                              <p:pRg st="6" end="6"/>
+                                            </p:txEl>
+                                          </p:spTgt>
+                                        </p:tgtEl>
+                                        <p:attrNameLst>
+                                          <p:attrName>style.visibility</p:attrName>
+                                        </p:attrNameLst>
+                                      </p:cBhvr>
+                                      <p:to>
+                                        <p:strVal val="visible"/>
+                                      </p:to>
+                                    </p:set>
+                                  </p:childTnLst>
+                                </p:cTn>
+                              </p:par>
+                            </p:childTnLst>
+                          </p:cTn>
+                        </p:par>
+                      </p:childTnLst>
+                    </p:cTn>
+                  </p:par>
+                  <p:par>
+                    <p:cTn id="23" fill="hold">
+                      <p:stCondLst>
+                        <p:cond delay="indefinite"/>
+                      </p:stCondLst>
+                      <p:childTnLst>
+                        <p:par>
+                          <p:cTn id="24" fill="hold">
+                            <p:stCondLst>
+                              <p:cond delay="0"/>
+                            </p:stCondLst>
+                            <p:childTnLst>
+                              <p:par>
+                                <p:cTn id="25" presetID="1" presetClass="entr" presetSubtype="0" fill="hold" grpId="0" nodeType="clickEffect">
+                                  <p:stCondLst>
+                                    <p:cond delay="0"/>
+                                  </p:stCondLst>
+                                  <p:childTnLst>
+                                    <p:set>
+                                      <p:cBhvr>
+                                        <p:cTn id="26" dur="1" fill="hold">
+                                          <p:stCondLst>
+                                            <p:cond delay="0"/>
+                                          </p:stCondLst>
+                                        </p:cTn>
+                                        <p:tgtEl>
+                                          <p:spTgt spid="3">
+                                            <p:txEl>
+                                              <p:pRg st="7" end="7"/>
+                                            </p:txEl>
+                                          </p:spTgt>
+                                        </p:tgtEl>
+                                        <p:attrNameLst>
+                                          <p:attrName>style.visibility</p:attrName>
+                                        </p:attrNameLst>
+                                      </p:cBhvr>
+                                      <p:to>
+                                        <p:strVal val="visible"/>
+                                      </p:to>
+                                    </p:set>
+                                  </p:childTnLst>
+                                </p:cTn>
+                              </p:par>
+                            </p:childTnLst>
+                          </p:cTn>
+                        </p:par>
+                      </p:childTnLst>
+                    </p:cTn>
+                  </p:par>
+                  <p:par>
+                    <p:cTn id="27" fill="hold">
+                      <p:stCondLst>
+                        <p:cond delay="indefinite"/>
+                      </p:stCondLst>
+                      <p:childTnLst>
+                        <p:par>
+                          <p:cTn id="28" fill="hold">
+                            <p:stCondLst>
+                              <p:cond delay="0"/>
+                            </p:stCondLst>
+                            <p:childTnLst>
+                              <p:par>
+                                <p:cTn id="29" presetID="1" presetClass="entr" presetSubtype="0" fill="hold" grpId="0" nodeType="clickEffect">
+                                  <p:stCondLst>
+                                    <p:cond delay="0"/>
+                                  </p:stCondLst>
+                                  <p:childTnLst>
+                                    <p:set>
+                                      <p:cBhvr>
+                                        <p:cTn id="30" dur="1" fill="hold">
+                                          <p:stCondLst>
+                                            <p:cond delay="0"/>
+                                          </p:stCondLst>
+                                        </p:cTn>
+                                        <p:tgtEl>
+                                          <p:spTgt spid="3">
+                                            <p:txEl>
+                                              <p:pRg st="8" end="8"/>
+                                            </p:txEl>
+                                          </p:spTgt>
+                                        </p:tgtEl>
+                                        <p:attrNameLst>
+                                          <p:attrName>style.visibility</p:attrName>
+                                        </p:attrNameLst>
+                                      </p:cBhvr>
+                                      <p:to>
+                                        <p:strVal val="visible"/>
+                                      </p:to>
+                                    </p:set>
+                                  </p:childTnLst>
+                                </p:cTn>
+                              </p:par>
+                            </p:childTnLst>
+                          </p:cTn>
+                        </p:par>
+                      </p:childTnLst>
+                    </p:cTn>
+                  </p:par>
+                </p:childTnLst>
+              </p:cTn>
+              <p:prevCondLst>
+                <p:cond evt="onPrev" delay="0">
+                  <p:tgtEl>
+                    <p:sldTgt/>
+                  </p:tgtEl>
+                </p:cond>
+              </p:prevCondLst>
+              <p:nextCondLst>
+                <p:cond evt="onNext" delay="0">
+                  <p:tgtEl>
+                    <p:sldTgt/>
+                  </p:tgtEl>
+                </p:cond>
+              </p:nextCondLst>
+            </p:seq>
+          </p:childTnLst>
+        </p:cTn>
+      </p:par>
+    </p:tnLst>
+    <p:bldLst>
+      <p:bldP spid="3" grpId="0" build="p"/>
+    </p:bldLst>
+  </p:timing>
 </p:sld>
 </file>
 
@@ -4176,8 +4587,8 @@
           </a:p>
         </p:txBody>
       </p:sp>
-      <mc:AlternateContent xmlns:mc="http://schemas.openxmlformats.org/markup-compatibility/2006">
-        <mc:Choice xmlns:a14="http://schemas.microsoft.com/office/drawing/2010/main" Requires="a14">
+      <mc:AlternateContent xmlns:mc="http://schemas.openxmlformats.org/markup-compatibility/2006" xmlns:a14="http://schemas.microsoft.com/office/drawing/2010/main">
+        <mc:Choice Requires="a14">
           <p:sp>
             <p:nvSpPr>
               <p:cNvPr id="3" name="Content Placeholder 2">
@@ -4584,7 +4995,7 @@
             </p:txBody>
           </p:sp>
         </mc:Choice>
-        <mc:Fallback>
+        <mc:Fallback xmlns="">
           <p:sp>
             <p:nvSpPr>
               <p:cNvPr id="3" name="Content Placeholder 2">
@@ -4634,6 +5045,284 @@
   <p:clrMapOvr>
     <a:masterClrMapping/>
   </p:clrMapOvr>
+  <p:timing>
+    <p:tnLst>
+      <p:par>
+        <p:cTn id="1" dur="indefinite" restart="never" nodeType="tmRoot">
+          <p:childTnLst>
+            <p:seq concurrent="1" nextAc="seek">
+              <p:cTn id="2" dur="indefinite" nodeType="mainSeq">
+                <p:childTnLst>
+                  <p:par>
+                    <p:cTn id="3" fill="hold">
+                      <p:stCondLst>
+                        <p:cond delay="indefinite"/>
+                      </p:stCondLst>
+                      <p:childTnLst>
+                        <p:par>
+                          <p:cTn id="4" fill="hold">
+                            <p:stCondLst>
+                              <p:cond delay="0"/>
+                            </p:stCondLst>
+                            <p:childTnLst>
+                              <p:par>
+                                <p:cTn id="5" presetID="1" presetClass="entr" presetSubtype="0" fill="hold" grpId="0" nodeType="clickEffect">
+                                  <p:stCondLst>
+                                    <p:cond delay="0"/>
+                                  </p:stCondLst>
+                                  <p:childTnLst>
+                                    <p:set>
+                                      <p:cBhvr>
+                                        <p:cTn id="6" dur="1" fill="hold">
+                                          <p:stCondLst>
+                                            <p:cond delay="0"/>
+                                          </p:stCondLst>
+                                        </p:cTn>
+                                        <p:tgtEl>
+                                          <p:spTgt spid="3">
+                                            <p:txEl>
+                                              <p:pRg st="0" end="0"/>
+                                            </p:txEl>
+                                          </p:spTgt>
+                                        </p:tgtEl>
+                                        <p:attrNameLst>
+                                          <p:attrName>style.visibility</p:attrName>
+                                        </p:attrNameLst>
+                                      </p:cBhvr>
+                                      <p:to>
+                                        <p:strVal val="visible"/>
+                                      </p:to>
+                                    </p:set>
+                                  </p:childTnLst>
+                                </p:cTn>
+                              </p:par>
+                            </p:childTnLst>
+                          </p:cTn>
+                        </p:par>
+                      </p:childTnLst>
+                    </p:cTn>
+                  </p:par>
+                  <p:par>
+                    <p:cTn id="7" fill="hold">
+                      <p:stCondLst>
+                        <p:cond delay="indefinite"/>
+                      </p:stCondLst>
+                      <p:childTnLst>
+                        <p:par>
+                          <p:cTn id="8" fill="hold">
+                            <p:stCondLst>
+                              <p:cond delay="0"/>
+                            </p:stCondLst>
+                            <p:childTnLst>
+                              <p:par>
+                                <p:cTn id="9" presetID="1" presetClass="entr" presetSubtype="0" fill="hold" grpId="0" nodeType="clickEffect">
+                                  <p:stCondLst>
+                                    <p:cond delay="0"/>
+                                  </p:stCondLst>
+                                  <p:childTnLst>
+                                    <p:set>
+                                      <p:cBhvr>
+                                        <p:cTn id="10" dur="1" fill="hold">
+                                          <p:stCondLst>
+                                            <p:cond delay="0"/>
+                                          </p:stCondLst>
+                                        </p:cTn>
+                                        <p:tgtEl>
+                                          <p:spTgt spid="3">
+                                            <p:txEl>
+                                              <p:pRg st="1" end="1"/>
+                                            </p:txEl>
+                                          </p:spTgt>
+                                        </p:tgtEl>
+                                        <p:attrNameLst>
+                                          <p:attrName>style.visibility</p:attrName>
+                                        </p:attrNameLst>
+                                      </p:cBhvr>
+                                      <p:to>
+                                        <p:strVal val="visible"/>
+                                      </p:to>
+                                    </p:set>
+                                  </p:childTnLst>
+                                </p:cTn>
+                              </p:par>
+                            </p:childTnLst>
+                          </p:cTn>
+                        </p:par>
+                      </p:childTnLst>
+                    </p:cTn>
+                  </p:par>
+                  <p:par>
+                    <p:cTn id="11" fill="hold">
+                      <p:stCondLst>
+                        <p:cond delay="indefinite"/>
+                      </p:stCondLst>
+                      <p:childTnLst>
+                        <p:par>
+                          <p:cTn id="12" fill="hold">
+                            <p:stCondLst>
+                              <p:cond delay="0"/>
+                            </p:stCondLst>
+                            <p:childTnLst>
+                              <p:par>
+                                <p:cTn id="13" presetID="1" presetClass="entr" presetSubtype="0" fill="hold" grpId="0" nodeType="clickEffect">
+                                  <p:stCondLst>
+                                    <p:cond delay="0"/>
+                                  </p:stCondLst>
+                                  <p:childTnLst>
+                                    <p:set>
+                                      <p:cBhvr>
+                                        <p:cTn id="14" dur="1" fill="hold">
+                                          <p:stCondLst>
+                                            <p:cond delay="0"/>
+                                          </p:stCondLst>
+                                        </p:cTn>
+                                        <p:tgtEl>
+                                          <p:spTgt spid="3">
+                                            <p:txEl>
+                                              <p:pRg st="2" end="2"/>
+                                            </p:txEl>
+                                          </p:spTgt>
+                                        </p:tgtEl>
+                                        <p:attrNameLst>
+                                          <p:attrName>style.visibility</p:attrName>
+                                        </p:attrNameLst>
+                                      </p:cBhvr>
+                                      <p:to>
+                                        <p:strVal val="visible"/>
+                                      </p:to>
+                                    </p:set>
+                                  </p:childTnLst>
+                                </p:cTn>
+                              </p:par>
+                            </p:childTnLst>
+                          </p:cTn>
+                        </p:par>
+                      </p:childTnLst>
+                    </p:cTn>
+                  </p:par>
+                  <p:par>
+                    <p:cTn id="15" fill="hold">
+                      <p:stCondLst>
+                        <p:cond delay="indefinite"/>
+                      </p:stCondLst>
+                      <p:childTnLst>
+                        <p:par>
+                          <p:cTn id="16" fill="hold">
+                            <p:stCondLst>
+                              <p:cond delay="0"/>
+                            </p:stCondLst>
+                            <p:childTnLst>
+                              <p:par>
+                                <p:cTn id="17" presetID="1" presetClass="entr" presetSubtype="0" fill="hold" grpId="0" nodeType="clickEffect">
+                                  <p:stCondLst>
+                                    <p:cond delay="0"/>
+                                  </p:stCondLst>
+                                  <p:childTnLst>
+                                    <p:set>
+                                      <p:cBhvr>
+                                        <p:cTn id="18" dur="1" fill="hold">
+                                          <p:stCondLst>
+                                            <p:cond delay="0"/>
+                                          </p:stCondLst>
+                                        </p:cTn>
+                                        <p:tgtEl>
+                                          <p:spTgt spid="3">
+                                            <p:txEl>
+                                              <p:pRg st="3" end="3"/>
+                                            </p:txEl>
+                                          </p:spTgt>
+                                        </p:tgtEl>
+                                        <p:attrNameLst>
+                                          <p:attrName>style.visibility</p:attrName>
+                                        </p:attrNameLst>
+                                      </p:cBhvr>
+                                      <p:to>
+                                        <p:strVal val="visible"/>
+                                      </p:to>
+                                    </p:set>
+                                  </p:childTnLst>
+                                </p:cTn>
+                              </p:par>
+                            </p:childTnLst>
+                          </p:cTn>
+                        </p:par>
+                      </p:childTnLst>
+                    </p:cTn>
+                  </p:par>
+                  <p:par>
+                    <p:cTn id="19" fill="hold">
+                      <p:stCondLst>
+                        <p:cond delay="indefinite"/>
+                      </p:stCondLst>
+                      <p:childTnLst>
+                        <p:par>
+                          <p:cTn id="20" fill="hold">
+                            <p:stCondLst>
+                              <p:cond delay="0"/>
+                            </p:stCondLst>
+                            <p:childTnLst>
+                              <p:par>
+                                <p:cTn id="21" presetID="1" presetClass="entr" presetSubtype="0" fill="hold" grpId="0" nodeType="clickEffect">
+                                  <p:stCondLst>
+                                    <p:cond delay="0"/>
+                                  </p:stCondLst>
+                                  <p:childTnLst>
+                                    <p:set>
+                                      <p:cBhvr>
+                                        <p:cTn id="22" dur="1" fill="hold">
+                                          <p:stCondLst>
+                                            <p:cond delay="0"/>
+                                          </p:stCondLst>
+                                        </p:cTn>
+                                        <p:tgtEl>
+                                          <p:spTgt spid="3">
+                                            <p:txEl>
+                                              <p:pRg st="4" end="4"/>
+                                            </p:txEl>
+                                          </p:spTgt>
+                                        </p:tgtEl>
+                                        <p:attrNameLst>
+                                          <p:attrName>style.visibility</p:attrName>
+                                        </p:attrNameLst>
+                                      </p:cBhvr>
+                                      <p:to>
+                                        <p:strVal val="visible"/>
+                                      </p:to>
+                                    </p:set>
+                                  </p:childTnLst>
+                                </p:cTn>
+                              </p:par>
+                            </p:childTnLst>
+                          </p:cTn>
+                        </p:par>
+                      </p:childTnLst>
+                    </p:cTn>
+                  </p:par>
+                </p:childTnLst>
+              </p:cTn>
+              <p:prevCondLst>
+                <p:cond evt="onPrev" delay="0">
+                  <p:tgtEl>
+                    <p:sldTgt/>
+                  </p:tgtEl>
+                </p:cond>
+              </p:prevCondLst>
+              <p:nextCondLst>
+                <p:cond evt="onNext" delay="0">
+                  <p:tgtEl>
+                    <p:sldTgt/>
+                  </p:tgtEl>
+                </p:cond>
+              </p:nextCondLst>
+            </p:seq>
+          </p:childTnLst>
+        </p:cTn>
+      </p:par>
+    </p:tnLst>
+    <p:bldLst>
+      <p:bldP spid="3" grpId="0" build="p"/>
+    </p:bldLst>
+  </p:timing>
 </p:sld>
 </file>
 
@@ -5195,6 +5884,425 @@
                 <a:endParaRPr lang="en-US" dirty="0"/>
               </a:p>
               <a:p>
+                <a:r>
+                  <a:rPr lang="en-US" dirty="0"/>
+                  <a:t>Charging an RC circuit: </a:t>
+                </a:r>
+                <a14:m>
+                  <m:oMath xmlns:m="http://schemas.openxmlformats.org/officeDocument/2006/math">
+                    <m:r>
+                      <a:rPr lang="en-US" b="0" i="1" smtClean="0">
+                        <a:latin typeface="Cambria Math" panose="02040503050406030204" pitchFamily="18" charset="0"/>
+                      </a:rPr>
+                      <m:t>𝑉</m:t>
+                    </m:r>
+                    <m:d>
+                      <m:dPr>
+                        <m:ctrlPr>
+                          <a:rPr lang="en-US" b="0" i="1" smtClean="0">
+                            <a:latin typeface="Cambria Math" panose="02040503050406030204" pitchFamily="18" charset="0"/>
+                          </a:rPr>
+                        </m:ctrlPr>
+                      </m:dPr>
+                      <m:e>
+                        <m:r>
+                          <a:rPr lang="en-US" b="0" i="1" smtClean="0">
+                            <a:latin typeface="Cambria Math" panose="02040503050406030204" pitchFamily="18" charset="0"/>
+                          </a:rPr>
+                          <m:t>𝑡</m:t>
+                        </m:r>
+                      </m:e>
+                    </m:d>
+                    <m:r>
+                      <a:rPr lang="en-US" b="0" i="1" smtClean="0">
+                        <a:latin typeface="Cambria Math" panose="02040503050406030204" pitchFamily="18" charset="0"/>
+                      </a:rPr>
+                      <m:t>=</m:t>
+                    </m:r>
+                    <m:sSub>
+                      <m:sSubPr>
+                        <m:ctrlPr>
+                          <a:rPr lang="en-US" b="0" i="1" smtClean="0">
+                            <a:latin typeface="Cambria Math" panose="02040503050406030204" pitchFamily="18" charset="0"/>
+                          </a:rPr>
+                        </m:ctrlPr>
+                      </m:sSubPr>
+                      <m:e>
+                        <m:r>
+                          <a:rPr lang="en-US" b="0" i="1" smtClean="0">
+                            <a:latin typeface="Cambria Math" panose="02040503050406030204" pitchFamily="18" charset="0"/>
+                          </a:rPr>
+                          <m:t>𝑉</m:t>
+                        </m:r>
+                      </m:e>
+                      <m:sub>
+                        <m:r>
+                          <a:rPr lang="en-US" b="0" i="1" smtClean="0">
+                            <a:latin typeface="Cambria Math" panose="02040503050406030204" pitchFamily="18" charset="0"/>
+                          </a:rPr>
+                          <m:t>0</m:t>
+                        </m:r>
+                      </m:sub>
+                    </m:sSub>
+                    <m:r>
+                      <a:rPr lang="en-US" b="0" i="1" smtClean="0">
+                        <a:latin typeface="Cambria Math" panose="02040503050406030204" pitchFamily="18" charset="0"/>
+                      </a:rPr>
+                      <m:t>(1−</m:t>
+                    </m:r>
+                    <m:sSup>
+                      <m:sSupPr>
+                        <m:ctrlPr>
+                          <a:rPr lang="en-US" b="0" i="1" smtClean="0">
+                            <a:latin typeface="Cambria Math" panose="02040503050406030204" pitchFamily="18" charset="0"/>
+                          </a:rPr>
+                        </m:ctrlPr>
+                      </m:sSupPr>
+                      <m:e>
+                        <m:r>
+                          <a:rPr lang="en-US" b="0" i="1" smtClean="0">
+                            <a:latin typeface="Cambria Math" panose="02040503050406030204" pitchFamily="18" charset="0"/>
+                          </a:rPr>
+                          <m:t>𝑒</m:t>
+                        </m:r>
+                      </m:e>
+                      <m:sup>
+                        <m:r>
+                          <a:rPr lang="en-US" b="0" i="1" smtClean="0">
+                            <a:latin typeface="Cambria Math" panose="02040503050406030204" pitchFamily="18" charset="0"/>
+                          </a:rPr>
+                          <m:t>−</m:t>
+                        </m:r>
+                        <m:f>
+                          <m:fPr>
+                            <m:ctrlPr>
+                              <a:rPr lang="en-US" b="0" i="1" smtClean="0">
+                                <a:latin typeface="Cambria Math" panose="02040503050406030204" pitchFamily="18" charset="0"/>
+                              </a:rPr>
+                            </m:ctrlPr>
+                          </m:fPr>
+                          <m:num>
+                            <m:r>
+                              <a:rPr lang="en-US" b="0" i="1" smtClean="0">
+                                <a:latin typeface="Cambria Math" panose="02040503050406030204" pitchFamily="18" charset="0"/>
+                              </a:rPr>
+                              <m:t>𝑡</m:t>
+                            </m:r>
+                          </m:num>
+                          <m:den>
+                            <m:r>
+                              <a:rPr lang="en-US" b="0" i="1" smtClean="0">
+                                <a:latin typeface="Cambria Math" panose="02040503050406030204" pitchFamily="18" charset="0"/>
+                              </a:rPr>
+                              <m:t>𝑅𝐶</m:t>
+                            </m:r>
+                          </m:den>
+                        </m:f>
+                      </m:sup>
+                    </m:sSup>
+                    <m:r>
+                      <a:rPr lang="en-US" b="0" i="1" smtClean="0">
+                        <a:latin typeface="Cambria Math" panose="02040503050406030204" pitchFamily="18" charset="0"/>
+                      </a:rPr>
+                      <m:t>)</m:t>
+                    </m:r>
+                  </m:oMath>
+                </a14:m>
+                <a:endParaRPr lang="en-US" dirty="0"/>
+              </a:p>
+              <a:p>
+                <a:r>
+                  <a:rPr lang="en-US" dirty="0"/>
+                  <a:t>Discharging an RC circuit: </a:t>
+                </a:r>
+                <a14:m>
+                  <m:oMath xmlns:m="http://schemas.openxmlformats.org/officeDocument/2006/math">
+                    <m:r>
+                      <a:rPr lang="en-US" b="0" i="1" smtClean="0">
+                        <a:latin typeface="Cambria Math" panose="02040503050406030204" pitchFamily="18" charset="0"/>
+                      </a:rPr>
+                      <m:t>𝑉</m:t>
+                    </m:r>
+                    <m:d>
+                      <m:dPr>
+                        <m:ctrlPr>
+                          <a:rPr lang="en-US" b="0" i="1" smtClean="0">
+                            <a:latin typeface="Cambria Math" panose="02040503050406030204" pitchFamily="18" charset="0"/>
+                          </a:rPr>
+                        </m:ctrlPr>
+                      </m:dPr>
+                      <m:e>
+                        <m:r>
+                          <a:rPr lang="en-US" b="0" i="1" smtClean="0">
+                            <a:latin typeface="Cambria Math" panose="02040503050406030204" pitchFamily="18" charset="0"/>
+                          </a:rPr>
+                          <m:t>𝑡</m:t>
+                        </m:r>
+                      </m:e>
+                    </m:d>
+                    <m:r>
+                      <a:rPr lang="en-US" b="0" i="1" smtClean="0">
+                        <a:latin typeface="Cambria Math" panose="02040503050406030204" pitchFamily="18" charset="0"/>
+                      </a:rPr>
+                      <m:t>=</m:t>
+                    </m:r>
+                    <m:sSub>
+                      <m:sSubPr>
+                        <m:ctrlPr>
+                          <a:rPr lang="en-US" b="0" i="1" smtClean="0">
+                            <a:latin typeface="Cambria Math" panose="02040503050406030204" pitchFamily="18" charset="0"/>
+                          </a:rPr>
+                        </m:ctrlPr>
+                      </m:sSubPr>
+                      <m:e>
+                        <m:r>
+                          <a:rPr lang="en-US" b="0" i="1" smtClean="0">
+                            <a:latin typeface="Cambria Math" panose="02040503050406030204" pitchFamily="18" charset="0"/>
+                          </a:rPr>
+                          <m:t>𝑉</m:t>
+                        </m:r>
+                      </m:e>
+                      <m:sub>
+                        <m:r>
+                          <a:rPr lang="en-US" b="0" i="1" smtClean="0">
+                            <a:latin typeface="Cambria Math" panose="02040503050406030204" pitchFamily="18" charset="0"/>
+                          </a:rPr>
+                          <m:t>0</m:t>
+                        </m:r>
+                      </m:sub>
+                    </m:sSub>
+                    <m:r>
+                      <a:rPr lang="en-US" b="0" i="1" smtClean="0">
+                        <a:latin typeface="Cambria Math" panose="02040503050406030204" pitchFamily="18" charset="0"/>
+                      </a:rPr>
+                      <m:t>(</m:t>
+                    </m:r>
+                    <m:sSup>
+                      <m:sSupPr>
+                        <m:ctrlPr>
+                          <a:rPr lang="en-US" b="0" i="1" smtClean="0">
+                            <a:latin typeface="Cambria Math" panose="02040503050406030204" pitchFamily="18" charset="0"/>
+                          </a:rPr>
+                        </m:ctrlPr>
+                      </m:sSupPr>
+                      <m:e>
+                        <m:r>
+                          <a:rPr lang="en-US" b="0" i="1" smtClean="0">
+                            <a:latin typeface="Cambria Math" panose="02040503050406030204" pitchFamily="18" charset="0"/>
+                          </a:rPr>
+                          <m:t>𝑒</m:t>
+                        </m:r>
+                      </m:e>
+                      <m:sup>
+                        <m:r>
+                          <a:rPr lang="en-US" b="0" i="1" smtClean="0">
+                            <a:latin typeface="Cambria Math" panose="02040503050406030204" pitchFamily="18" charset="0"/>
+                          </a:rPr>
+                          <m:t>−</m:t>
+                        </m:r>
+                        <m:f>
+                          <m:fPr>
+                            <m:ctrlPr>
+                              <a:rPr lang="en-US" b="0" i="1" smtClean="0">
+                                <a:latin typeface="Cambria Math" panose="02040503050406030204" pitchFamily="18" charset="0"/>
+                              </a:rPr>
+                            </m:ctrlPr>
+                          </m:fPr>
+                          <m:num>
+                            <m:r>
+                              <a:rPr lang="en-US" b="0" i="1" smtClean="0">
+                                <a:latin typeface="Cambria Math" panose="02040503050406030204" pitchFamily="18" charset="0"/>
+                              </a:rPr>
+                              <m:t>𝑡</m:t>
+                            </m:r>
+                          </m:num>
+                          <m:den>
+                            <m:r>
+                              <a:rPr lang="en-US" b="0" i="1" smtClean="0">
+                                <a:latin typeface="Cambria Math" panose="02040503050406030204" pitchFamily="18" charset="0"/>
+                              </a:rPr>
+                              <m:t>𝑅𝐶</m:t>
+                            </m:r>
+                          </m:den>
+                        </m:f>
+                      </m:sup>
+                    </m:sSup>
+                    <m:r>
+                      <a:rPr lang="en-US" b="0" i="1" smtClean="0">
+                        <a:latin typeface="Cambria Math" panose="02040503050406030204" pitchFamily="18" charset="0"/>
+                      </a:rPr>
+                      <m:t>)</m:t>
+                    </m:r>
+                  </m:oMath>
+                </a14:m>
+                <a:r>
+                  <a:rPr lang="en-US" dirty="0"/>
+                  <a:t>, </a:t>
+                </a:r>
+                <a14:m>
+                  <m:oMath xmlns:m="http://schemas.openxmlformats.org/officeDocument/2006/math">
+                    <m:r>
+                      <a:rPr lang="en-US" b="0" i="1" dirty="0" smtClean="0">
+                        <a:latin typeface="Cambria Math" panose="02040503050406030204" pitchFamily="18" charset="0"/>
+                      </a:rPr>
+                      <m:t>𝑄</m:t>
+                    </m:r>
+                    <m:d>
+                      <m:dPr>
+                        <m:ctrlPr>
+                          <a:rPr lang="en-US" b="0" i="1" dirty="0" smtClean="0">
+                            <a:latin typeface="Cambria Math" panose="02040503050406030204" pitchFamily="18" charset="0"/>
+                          </a:rPr>
+                        </m:ctrlPr>
+                      </m:dPr>
+                      <m:e>
+                        <m:r>
+                          <a:rPr lang="en-US" b="0" i="1" dirty="0" smtClean="0">
+                            <a:latin typeface="Cambria Math" panose="02040503050406030204" pitchFamily="18" charset="0"/>
+                          </a:rPr>
+                          <m:t>𝑡</m:t>
+                        </m:r>
+                      </m:e>
+                    </m:d>
+                    <m:r>
+                      <a:rPr lang="en-US" b="0" i="1" dirty="0" smtClean="0">
+                        <a:latin typeface="Cambria Math" panose="02040503050406030204" pitchFamily="18" charset="0"/>
+                      </a:rPr>
+                      <m:t>=</m:t>
+                    </m:r>
+                    <m:sSub>
+                      <m:sSubPr>
+                        <m:ctrlPr>
+                          <a:rPr lang="en-US" b="0" i="1" dirty="0" smtClean="0">
+                            <a:latin typeface="Cambria Math" panose="02040503050406030204" pitchFamily="18" charset="0"/>
+                          </a:rPr>
+                        </m:ctrlPr>
+                      </m:sSubPr>
+                      <m:e>
+                        <m:r>
+                          <a:rPr lang="en-US" b="0" i="1" dirty="0" smtClean="0">
+                            <a:latin typeface="Cambria Math" panose="02040503050406030204" pitchFamily="18" charset="0"/>
+                          </a:rPr>
+                          <m:t>𝑄</m:t>
+                        </m:r>
+                      </m:e>
+                      <m:sub>
+                        <m:r>
+                          <a:rPr lang="en-US" b="0" i="1" dirty="0" smtClean="0">
+                            <a:latin typeface="Cambria Math" panose="02040503050406030204" pitchFamily="18" charset="0"/>
+                          </a:rPr>
+                          <m:t>0</m:t>
+                        </m:r>
+                      </m:sub>
+                    </m:sSub>
+                    <m:r>
+                      <a:rPr lang="en-US" b="0" i="1" dirty="0" smtClean="0">
+                        <a:latin typeface="Cambria Math" panose="02040503050406030204" pitchFamily="18" charset="0"/>
+                      </a:rPr>
+                      <m:t>(</m:t>
+                    </m:r>
+                    <m:sSup>
+                      <m:sSupPr>
+                        <m:ctrlPr>
+                          <a:rPr lang="en-US" b="0" i="1" dirty="0" smtClean="0">
+                            <a:latin typeface="Cambria Math" panose="02040503050406030204" pitchFamily="18" charset="0"/>
+                          </a:rPr>
+                        </m:ctrlPr>
+                      </m:sSupPr>
+                      <m:e>
+                        <m:r>
+                          <a:rPr lang="en-US" b="0" i="1" dirty="0" smtClean="0">
+                            <a:latin typeface="Cambria Math" panose="02040503050406030204" pitchFamily="18" charset="0"/>
+                          </a:rPr>
+                          <m:t>𝑒</m:t>
+                        </m:r>
+                      </m:e>
+                      <m:sup>
+                        <m:r>
+                          <a:rPr lang="en-US" b="0" i="1" dirty="0" smtClean="0">
+                            <a:latin typeface="Cambria Math" panose="02040503050406030204" pitchFamily="18" charset="0"/>
+                          </a:rPr>
+                          <m:t>−</m:t>
+                        </m:r>
+                        <m:f>
+                          <m:fPr>
+                            <m:ctrlPr>
+                              <a:rPr lang="en-US" b="0" i="1" dirty="0" smtClean="0">
+                                <a:latin typeface="Cambria Math" panose="02040503050406030204" pitchFamily="18" charset="0"/>
+                              </a:rPr>
+                            </m:ctrlPr>
+                          </m:fPr>
+                          <m:num>
+                            <m:r>
+                              <a:rPr lang="en-US" b="0" i="1" dirty="0" smtClean="0">
+                                <a:latin typeface="Cambria Math" panose="02040503050406030204" pitchFamily="18" charset="0"/>
+                              </a:rPr>
+                              <m:t>𝑡</m:t>
+                            </m:r>
+                          </m:num>
+                          <m:den>
+                            <m:r>
+                              <a:rPr lang="en-US" b="0" i="1" dirty="0" smtClean="0">
+                                <a:latin typeface="Cambria Math" panose="02040503050406030204" pitchFamily="18" charset="0"/>
+                              </a:rPr>
+                              <m:t>𝑅𝐶</m:t>
+                            </m:r>
+                          </m:den>
+                        </m:f>
+                      </m:sup>
+                    </m:sSup>
+                    <m:r>
+                      <a:rPr lang="en-US" b="0" i="1" dirty="0" smtClean="0">
+                        <a:latin typeface="Cambria Math" panose="02040503050406030204" pitchFamily="18" charset="0"/>
+                      </a:rPr>
+                      <m:t>)</m:t>
+                    </m:r>
+                  </m:oMath>
+                </a14:m>
+                <a:endParaRPr lang="en-US" dirty="0"/>
+              </a:p>
+              <a:p>
+                <a14:m>
+                  <m:oMath xmlns:m="http://schemas.openxmlformats.org/officeDocument/2006/math">
+                    <m:r>
+                      <a:rPr lang="en-US" b="0" i="1" smtClean="0">
+                        <a:latin typeface="Cambria Math" panose="02040503050406030204" pitchFamily="18" charset="0"/>
+                      </a:rPr>
+                      <m:t>𝐼</m:t>
+                    </m:r>
+                    <m:r>
+                      <a:rPr lang="en-US" b="0" i="1" smtClean="0">
+                        <a:latin typeface="Cambria Math" panose="02040503050406030204" pitchFamily="18" charset="0"/>
+                      </a:rPr>
+                      <m:t>=</m:t>
+                    </m:r>
+                    <m:f>
+                      <m:fPr>
+                        <m:ctrlPr>
+                          <a:rPr lang="en-US" b="0" i="1" smtClean="0">
+                            <a:latin typeface="Cambria Math" panose="02040503050406030204" pitchFamily="18" charset="0"/>
+                          </a:rPr>
+                        </m:ctrlPr>
+                      </m:fPr>
+                      <m:num>
+                        <m:r>
+                          <a:rPr lang="en-US" b="0" i="1" smtClean="0">
+                            <a:latin typeface="Cambria Math" panose="02040503050406030204" pitchFamily="18" charset="0"/>
+                          </a:rPr>
+                          <m:t>𝑑𝑞</m:t>
+                        </m:r>
+                      </m:num>
+                      <m:den>
+                        <m:r>
+                          <a:rPr lang="en-US" b="0" i="1" smtClean="0">
+                            <a:latin typeface="Cambria Math" panose="02040503050406030204" pitchFamily="18" charset="0"/>
+                          </a:rPr>
+                          <m:t>𝑑𝑡</m:t>
+                        </m:r>
+                      </m:den>
+                    </m:f>
+                  </m:oMath>
+                </a14:m>
                 <a:endParaRPr lang="en-US" dirty="0"/>
               </a:p>
               <a:p>
@@ -5256,6 +6364,382 @@
   <p:clrMapOvr>
     <a:masterClrMapping/>
   </p:clrMapOvr>
+  <p:timing>
+    <p:tnLst>
+      <p:par>
+        <p:cTn id="1" dur="indefinite" restart="never" nodeType="tmRoot">
+          <p:childTnLst>
+            <p:seq concurrent="1" nextAc="seek">
+              <p:cTn id="2" dur="indefinite" nodeType="mainSeq">
+                <p:childTnLst>
+                  <p:par>
+                    <p:cTn id="3" fill="hold">
+                      <p:stCondLst>
+                        <p:cond delay="indefinite"/>
+                      </p:stCondLst>
+                      <p:childTnLst>
+                        <p:par>
+                          <p:cTn id="4" fill="hold">
+                            <p:stCondLst>
+                              <p:cond delay="0"/>
+                            </p:stCondLst>
+                            <p:childTnLst>
+                              <p:par>
+                                <p:cTn id="5" presetID="1" presetClass="entr" presetSubtype="0" fill="hold" grpId="0" nodeType="clickEffect">
+                                  <p:stCondLst>
+                                    <p:cond delay="0"/>
+                                  </p:stCondLst>
+                                  <p:childTnLst>
+                                    <p:set>
+                                      <p:cBhvr>
+                                        <p:cTn id="6" dur="1" fill="hold">
+                                          <p:stCondLst>
+                                            <p:cond delay="0"/>
+                                          </p:stCondLst>
+                                        </p:cTn>
+                                        <p:tgtEl>
+                                          <p:spTgt spid="3">
+                                            <p:txEl>
+                                              <p:pRg st="0" end="0"/>
+                                            </p:txEl>
+                                          </p:spTgt>
+                                        </p:tgtEl>
+                                        <p:attrNameLst>
+                                          <p:attrName>style.visibility</p:attrName>
+                                        </p:attrNameLst>
+                                      </p:cBhvr>
+                                      <p:to>
+                                        <p:strVal val="visible"/>
+                                      </p:to>
+                                    </p:set>
+                                  </p:childTnLst>
+                                </p:cTn>
+                              </p:par>
+                            </p:childTnLst>
+                          </p:cTn>
+                        </p:par>
+                      </p:childTnLst>
+                    </p:cTn>
+                  </p:par>
+                  <p:par>
+                    <p:cTn id="7" fill="hold">
+                      <p:stCondLst>
+                        <p:cond delay="indefinite"/>
+                      </p:stCondLst>
+                      <p:childTnLst>
+                        <p:par>
+                          <p:cTn id="8" fill="hold">
+                            <p:stCondLst>
+                              <p:cond delay="0"/>
+                            </p:stCondLst>
+                            <p:childTnLst>
+                              <p:par>
+                                <p:cTn id="9" presetID="1" presetClass="entr" presetSubtype="0" fill="hold" grpId="0" nodeType="clickEffect">
+                                  <p:stCondLst>
+                                    <p:cond delay="0"/>
+                                  </p:stCondLst>
+                                  <p:childTnLst>
+                                    <p:set>
+                                      <p:cBhvr>
+                                        <p:cTn id="10" dur="1" fill="hold">
+                                          <p:stCondLst>
+                                            <p:cond delay="0"/>
+                                          </p:stCondLst>
+                                        </p:cTn>
+                                        <p:tgtEl>
+                                          <p:spTgt spid="3">
+                                            <p:txEl>
+                                              <p:pRg st="1" end="1"/>
+                                            </p:txEl>
+                                          </p:spTgt>
+                                        </p:tgtEl>
+                                        <p:attrNameLst>
+                                          <p:attrName>style.visibility</p:attrName>
+                                        </p:attrNameLst>
+                                      </p:cBhvr>
+                                      <p:to>
+                                        <p:strVal val="visible"/>
+                                      </p:to>
+                                    </p:set>
+                                  </p:childTnLst>
+                                </p:cTn>
+                              </p:par>
+                            </p:childTnLst>
+                          </p:cTn>
+                        </p:par>
+                      </p:childTnLst>
+                    </p:cTn>
+                  </p:par>
+                  <p:par>
+                    <p:cTn id="11" fill="hold">
+                      <p:stCondLst>
+                        <p:cond delay="indefinite"/>
+                      </p:stCondLst>
+                      <p:childTnLst>
+                        <p:par>
+                          <p:cTn id="12" fill="hold">
+                            <p:stCondLst>
+                              <p:cond delay="0"/>
+                            </p:stCondLst>
+                            <p:childTnLst>
+                              <p:par>
+                                <p:cTn id="13" presetID="1" presetClass="entr" presetSubtype="0" fill="hold" grpId="0" nodeType="clickEffect">
+                                  <p:stCondLst>
+                                    <p:cond delay="0"/>
+                                  </p:stCondLst>
+                                  <p:childTnLst>
+                                    <p:set>
+                                      <p:cBhvr>
+                                        <p:cTn id="14" dur="1" fill="hold">
+                                          <p:stCondLst>
+                                            <p:cond delay="0"/>
+                                          </p:stCondLst>
+                                        </p:cTn>
+                                        <p:tgtEl>
+                                          <p:spTgt spid="3">
+                                            <p:txEl>
+                                              <p:pRg st="2" end="2"/>
+                                            </p:txEl>
+                                          </p:spTgt>
+                                        </p:tgtEl>
+                                        <p:attrNameLst>
+                                          <p:attrName>style.visibility</p:attrName>
+                                        </p:attrNameLst>
+                                      </p:cBhvr>
+                                      <p:to>
+                                        <p:strVal val="visible"/>
+                                      </p:to>
+                                    </p:set>
+                                  </p:childTnLst>
+                                </p:cTn>
+                              </p:par>
+                            </p:childTnLst>
+                          </p:cTn>
+                        </p:par>
+                      </p:childTnLst>
+                    </p:cTn>
+                  </p:par>
+                  <p:par>
+                    <p:cTn id="15" fill="hold">
+                      <p:stCondLst>
+                        <p:cond delay="indefinite"/>
+                      </p:stCondLst>
+                      <p:childTnLst>
+                        <p:par>
+                          <p:cTn id="16" fill="hold">
+                            <p:stCondLst>
+                              <p:cond delay="0"/>
+                            </p:stCondLst>
+                            <p:childTnLst>
+                              <p:par>
+                                <p:cTn id="17" presetID="1" presetClass="entr" presetSubtype="0" fill="hold" grpId="0" nodeType="clickEffect">
+                                  <p:stCondLst>
+                                    <p:cond delay="0"/>
+                                  </p:stCondLst>
+                                  <p:childTnLst>
+                                    <p:set>
+                                      <p:cBhvr>
+                                        <p:cTn id="18" dur="1" fill="hold">
+                                          <p:stCondLst>
+                                            <p:cond delay="0"/>
+                                          </p:stCondLst>
+                                        </p:cTn>
+                                        <p:tgtEl>
+                                          <p:spTgt spid="3">
+                                            <p:txEl>
+                                              <p:pRg st="3" end="3"/>
+                                            </p:txEl>
+                                          </p:spTgt>
+                                        </p:tgtEl>
+                                        <p:attrNameLst>
+                                          <p:attrName>style.visibility</p:attrName>
+                                        </p:attrNameLst>
+                                      </p:cBhvr>
+                                      <p:to>
+                                        <p:strVal val="visible"/>
+                                      </p:to>
+                                    </p:set>
+                                  </p:childTnLst>
+                                </p:cTn>
+                              </p:par>
+                            </p:childTnLst>
+                          </p:cTn>
+                        </p:par>
+                      </p:childTnLst>
+                    </p:cTn>
+                  </p:par>
+                  <p:par>
+                    <p:cTn id="19" fill="hold">
+                      <p:stCondLst>
+                        <p:cond delay="indefinite"/>
+                      </p:stCondLst>
+                      <p:childTnLst>
+                        <p:par>
+                          <p:cTn id="20" fill="hold">
+                            <p:stCondLst>
+                              <p:cond delay="0"/>
+                            </p:stCondLst>
+                            <p:childTnLst>
+                              <p:par>
+                                <p:cTn id="21" presetID="1" presetClass="entr" presetSubtype="0" fill="hold" grpId="0" nodeType="clickEffect">
+                                  <p:stCondLst>
+                                    <p:cond delay="0"/>
+                                  </p:stCondLst>
+                                  <p:childTnLst>
+                                    <p:set>
+                                      <p:cBhvr>
+                                        <p:cTn id="22" dur="1" fill="hold">
+                                          <p:stCondLst>
+                                            <p:cond delay="0"/>
+                                          </p:stCondLst>
+                                        </p:cTn>
+                                        <p:tgtEl>
+                                          <p:spTgt spid="3">
+                                            <p:txEl>
+                                              <p:pRg st="4" end="4"/>
+                                            </p:txEl>
+                                          </p:spTgt>
+                                        </p:tgtEl>
+                                        <p:attrNameLst>
+                                          <p:attrName>style.visibility</p:attrName>
+                                        </p:attrNameLst>
+                                      </p:cBhvr>
+                                      <p:to>
+                                        <p:strVal val="visible"/>
+                                      </p:to>
+                                    </p:set>
+                                  </p:childTnLst>
+                                </p:cTn>
+                              </p:par>
+                            </p:childTnLst>
+                          </p:cTn>
+                        </p:par>
+                      </p:childTnLst>
+                    </p:cTn>
+                  </p:par>
+                  <p:par>
+                    <p:cTn id="23" fill="hold">
+                      <p:stCondLst>
+                        <p:cond delay="indefinite"/>
+                      </p:stCondLst>
+                      <p:childTnLst>
+                        <p:par>
+                          <p:cTn id="24" fill="hold">
+                            <p:stCondLst>
+                              <p:cond delay="0"/>
+                            </p:stCondLst>
+                            <p:childTnLst>
+                              <p:par>
+                                <p:cTn id="25" presetID="1" presetClass="entr" presetSubtype="0" fill="hold" grpId="0" nodeType="clickEffect">
+                                  <p:stCondLst>
+                                    <p:cond delay="0"/>
+                                  </p:stCondLst>
+                                  <p:childTnLst>
+                                    <p:set>
+                                      <p:cBhvr>
+                                        <p:cTn id="26" dur="1" fill="hold">
+                                          <p:stCondLst>
+                                            <p:cond delay="0"/>
+                                          </p:stCondLst>
+                                        </p:cTn>
+                                        <p:tgtEl>
+                                          <p:spTgt spid="3">
+                                            <p:txEl>
+                                              <p:pRg st="5" end="5"/>
+                                            </p:txEl>
+                                          </p:spTgt>
+                                        </p:tgtEl>
+                                        <p:attrNameLst>
+                                          <p:attrName>style.visibility</p:attrName>
+                                        </p:attrNameLst>
+                                      </p:cBhvr>
+                                      <p:to>
+                                        <p:strVal val="visible"/>
+                                      </p:to>
+                                    </p:set>
+                                  </p:childTnLst>
+                                </p:cTn>
+                              </p:par>
+                            </p:childTnLst>
+                          </p:cTn>
+                        </p:par>
+                      </p:childTnLst>
+                    </p:cTn>
+                  </p:par>
+                  <p:par>
+                    <p:cTn id="27" fill="hold">
+                      <p:stCondLst>
+                        <p:cond delay="indefinite"/>
+                      </p:stCondLst>
+                      <p:childTnLst>
+                        <p:par>
+                          <p:cTn id="28" fill="hold">
+                            <p:stCondLst>
+                              <p:cond delay="0"/>
+                            </p:stCondLst>
+                            <p:childTnLst>
+                              <p:par>
+                                <p:cTn id="29" presetID="1" presetClass="entr" presetSubtype="0" fill="hold" grpId="0" nodeType="clickEffect">
+                                  <p:stCondLst>
+                                    <p:cond delay="0"/>
+                                  </p:stCondLst>
+                                  <p:childTnLst>
+                                    <p:set>
+                                      <p:cBhvr>
+                                        <p:cTn id="30" dur="1" fill="hold">
+                                          <p:stCondLst>
+                                            <p:cond delay="0"/>
+                                          </p:stCondLst>
+                                        </p:cTn>
+                                        <p:tgtEl>
+                                          <p:spTgt spid="3">
+                                            <p:txEl>
+                                              <p:pRg st="6" end="6"/>
+                                            </p:txEl>
+                                          </p:spTgt>
+                                        </p:tgtEl>
+                                        <p:attrNameLst>
+                                          <p:attrName>style.visibility</p:attrName>
+                                        </p:attrNameLst>
+                                      </p:cBhvr>
+                                      <p:to>
+                                        <p:strVal val="visible"/>
+                                      </p:to>
+                                    </p:set>
+                                  </p:childTnLst>
+                                </p:cTn>
+                              </p:par>
+                            </p:childTnLst>
+                          </p:cTn>
+                        </p:par>
+                      </p:childTnLst>
+                    </p:cTn>
+                  </p:par>
+                </p:childTnLst>
+              </p:cTn>
+              <p:prevCondLst>
+                <p:cond evt="onPrev" delay="0">
+                  <p:tgtEl>
+                    <p:sldTgt/>
+                  </p:tgtEl>
+                </p:cond>
+              </p:prevCondLst>
+              <p:nextCondLst>
+                <p:cond evt="onNext" delay="0">
+                  <p:tgtEl>
+                    <p:sldTgt/>
+                  </p:tgtEl>
+                </p:cond>
+              </p:nextCondLst>
+            </p:seq>
+          </p:childTnLst>
+        </p:cTn>
+      </p:par>
+    </p:tnLst>
+    <p:bldLst>
+      <p:bldP spid="3" grpId="0" build="p"/>
+    </p:bldLst>
+  </p:timing>
 </p:sld>
 </file>
 

</xml_diff>